<commit_message>
Solving the conflict for the changed "Wireframe Mockups.pptx" document
</commit_message>
<xml_diff>
--- a/src/assets/documents/LnkMngr - Wireframe Mockups.pptx
+++ b/src/assets/documents/LnkMngr - Wireframe Mockups.pptx
@@ -105,6 +105,11 @@
       </a:defRPr>
     </a:lvl9pPr>
   </p:defaultTextStyle>
+  <p:extLst>
+    <p:ext uri="{EFAFB233-063F-42B5-8137-9DF3F51BA10A}">
+      <p15:sldGuideLst xmlns:p15="http://schemas.microsoft.com/office/powerpoint/2012/main"/>
+    </p:ext>
+  </p:extLst>
 </p:presentation>
 </file>
 
@@ -255,7 +260,7 @@
           <a:p>
             <a:fld id="{2BE928A8-C3AA-4BDA-967F-0A9A8DE64BC4}" type="datetimeFigureOut">
               <a:rPr lang="en-US" smtClean="0"/>
-              <a:t>7/17/2020</a:t>
+              <a:t>8/2/2020</a:t>
             </a:fld>
             <a:endParaRPr lang="en-US"/>
           </a:p>
@@ -453,7 +458,7 @@
           <a:p>
             <a:fld id="{2BE928A8-C3AA-4BDA-967F-0A9A8DE64BC4}" type="datetimeFigureOut">
               <a:rPr lang="en-US" smtClean="0"/>
-              <a:t>7/17/2020</a:t>
+              <a:t>8/2/2020</a:t>
             </a:fld>
             <a:endParaRPr lang="en-US"/>
           </a:p>
@@ -661,7 +666,7 @@
           <a:p>
             <a:fld id="{2BE928A8-C3AA-4BDA-967F-0A9A8DE64BC4}" type="datetimeFigureOut">
               <a:rPr lang="en-US" smtClean="0"/>
-              <a:t>7/17/2020</a:t>
+              <a:t>8/2/2020</a:t>
             </a:fld>
             <a:endParaRPr lang="en-US"/>
           </a:p>
@@ -859,7 +864,7 @@
           <a:p>
             <a:fld id="{2BE928A8-C3AA-4BDA-967F-0A9A8DE64BC4}" type="datetimeFigureOut">
               <a:rPr lang="en-US" smtClean="0"/>
-              <a:t>7/17/2020</a:t>
+              <a:t>8/2/2020</a:t>
             </a:fld>
             <a:endParaRPr lang="en-US"/>
           </a:p>
@@ -1134,7 +1139,7 @@
           <a:p>
             <a:fld id="{2BE928A8-C3AA-4BDA-967F-0A9A8DE64BC4}" type="datetimeFigureOut">
               <a:rPr lang="en-US" smtClean="0"/>
-              <a:t>7/17/2020</a:t>
+              <a:t>8/2/2020</a:t>
             </a:fld>
             <a:endParaRPr lang="en-US"/>
           </a:p>
@@ -1399,7 +1404,7 @@
           <a:p>
             <a:fld id="{2BE928A8-C3AA-4BDA-967F-0A9A8DE64BC4}" type="datetimeFigureOut">
               <a:rPr lang="en-US" smtClean="0"/>
-              <a:t>7/17/2020</a:t>
+              <a:t>8/2/2020</a:t>
             </a:fld>
             <a:endParaRPr lang="en-US"/>
           </a:p>
@@ -1811,7 +1816,7 @@
           <a:p>
             <a:fld id="{2BE928A8-C3AA-4BDA-967F-0A9A8DE64BC4}" type="datetimeFigureOut">
               <a:rPr lang="en-US" smtClean="0"/>
-              <a:t>7/17/2020</a:t>
+              <a:t>8/2/2020</a:t>
             </a:fld>
             <a:endParaRPr lang="en-US"/>
           </a:p>
@@ -1952,7 +1957,7 @@
           <a:p>
             <a:fld id="{2BE928A8-C3AA-4BDA-967F-0A9A8DE64BC4}" type="datetimeFigureOut">
               <a:rPr lang="en-US" smtClean="0"/>
-              <a:t>7/17/2020</a:t>
+              <a:t>8/2/2020</a:t>
             </a:fld>
             <a:endParaRPr lang="en-US"/>
           </a:p>
@@ -2065,7 +2070,7 @@
           <a:p>
             <a:fld id="{2BE928A8-C3AA-4BDA-967F-0A9A8DE64BC4}" type="datetimeFigureOut">
               <a:rPr lang="en-US" smtClean="0"/>
-              <a:t>7/17/2020</a:t>
+              <a:t>8/2/2020</a:t>
             </a:fld>
             <a:endParaRPr lang="en-US"/>
           </a:p>
@@ -2376,7 +2381,7 @@
           <a:p>
             <a:fld id="{2BE928A8-C3AA-4BDA-967F-0A9A8DE64BC4}" type="datetimeFigureOut">
               <a:rPr lang="en-US" smtClean="0"/>
-              <a:t>7/17/2020</a:t>
+              <a:t>8/2/2020</a:t>
             </a:fld>
             <a:endParaRPr lang="en-US"/>
           </a:p>
@@ -2664,7 +2669,7 @@
           <a:p>
             <a:fld id="{2BE928A8-C3AA-4BDA-967F-0A9A8DE64BC4}" type="datetimeFigureOut">
               <a:rPr lang="en-US" smtClean="0"/>
-              <a:t>7/17/2020</a:t>
+              <a:t>8/2/2020</a:t>
             </a:fld>
             <a:endParaRPr lang="en-US"/>
           </a:p>
@@ -2905,7 +2910,7 @@
           <a:p>
             <a:fld id="{2BE928A8-C3AA-4BDA-967F-0A9A8DE64BC4}" type="datetimeFigureOut">
               <a:rPr lang="en-US" smtClean="0"/>
-              <a:t>7/17/2020</a:t>
+              <a:t>8/2/2020</a:t>
             </a:fld>
             <a:endParaRPr lang="en-US"/>
           </a:p>
@@ -3343,7 +3348,7 @@
             <a:avLst/>
           </a:prstGeom>
           <a:solidFill>
-            <a:srgbClr val="BDBEE1"/>
+            <a:srgbClr val="143860"/>
           </a:solidFill>
           <a:ln>
             <a:noFill/>
@@ -3418,8 +3423,15 @@
             <a:r>
               <a:rPr lang="en-US" dirty="0">
                 <a:solidFill>
-                  <a:srgbClr val="511290"/>
+                  <a:srgbClr val="F7E609"/>
                 </a:solidFill>
+                <a:effectLst>
+                  <a:outerShdw blurRad="50800" dist="38100" dir="8100000" algn="tr" rotWithShape="0">
+                    <a:prstClr val="black">
+                      <a:alpha val="40000"/>
+                    </a:prstClr>
+                  </a:outerShdw>
+                </a:effectLst>
               </a:rPr>
               <a:t>Sidebar</a:t>
             </a:r>
@@ -3447,7 +3459,7 @@
             <a:avLst/>
           </a:prstGeom>
           <a:solidFill>
-            <a:srgbClr val="BDBEE1"/>
+            <a:srgbClr val="143860"/>
           </a:solidFill>
           <a:ln>
             <a:noFill/>
@@ -7711,8 +7723,15 @@
             <a:r>
               <a:rPr lang="en-US" sz="3200" i="1" dirty="0">
                 <a:solidFill>
-                  <a:srgbClr val="511290"/>
+                  <a:srgbClr val="F7E609"/>
                 </a:solidFill>
+                <a:effectLst>
+                  <a:outerShdw blurRad="50800" dist="38100" dir="8100000" algn="tr" rotWithShape="0">
+                    <a:prstClr val="black">
+                      <a:alpha val="40000"/>
+                    </a:prstClr>
+                  </a:outerShdw>
+                </a:effectLst>
                 <a:latin typeface="AngsanaUPC" panose="02020603050405020304" pitchFamily="18" charset="-34"/>
                 <a:cs typeface="AngsanaUPC" panose="02020603050405020304" pitchFamily="18" charset="-34"/>
               </a:rPr>
@@ -7752,8 +7771,15 @@
             <a:r>
               <a:rPr lang="en-US" sz="3200" i="1" dirty="0">
                 <a:solidFill>
-                  <a:srgbClr val="511290"/>
+                  <a:srgbClr val="F7E609"/>
                 </a:solidFill>
+                <a:effectLst>
+                  <a:outerShdw blurRad="50800" dist="38100" dir="8100000" algn="tr" rotWithShape="0">
+                    <a:prstClr val="black">
+                      <a:alpha val="40000"/>
+                    </a:prstClr>
+                  </a:outerShdw>
+                </a:effectLst>
                 <a:latin typeface="AngsanaUPC" panose="02020603050405020304" pitchFamily="18" charset="-34"/>
                 <a:cs typeface="AngsanaUPC" panose="02020603050405020304" pitchFamily="18" charset="-34"/>
               </a:rPr>
@@ -7987,68 +8013,56 @@
         <p:spPr>
           <a:xfrm>
             <a:off x="3569721" y="2460169"/>
-            <a:ext cx="2651760" cy="2462213"/>
+            <a:ext cx="2651760" cy="2739211"/>
           </a:xfrm>
           <a:prstGeom prst="rect">
             <a:avLst/>
           </a:prstGeom>
           <a:noFill/>
-          <a:ln w="15875">
-            <a:noFill/>
-          </a:ln>
         </p:spPr>
         <p:txBody>
-          <a:bodyPr wrap="square" lIns="0" tIns="0" rIns="0" bIns="0" rtlCol="0" anchor="t" anchorCtr="0">
+          <a:bodyPr wrap="square" rtlCol="0">
             <a:spAutoFit/>
           </a:bodyPr>
-          <a:lstStyle/>
+          <a:lstStyle>
+            <a:defPPr>
+              <a:defRPr lang="en-US"/>
+            </a:defPPr>
+            <a:lvl1pPr>
+              <a:defRPr sz="3600" i="1">
+                <a:solidFill>
+                  <a:srgbClr val="F7E609"/>
+                </a:solidFill>
+                <a:effectLst>
+                  <a:outerShdw blurRad="25400" dist="38100" dir="8100000" algn="tr" rotWithShape="0">
+                    <a:prstClr val="black">
+                      <a:alpha val="70000"/>
+                    </a:prstClr>
+                  </a:outerShdw>
+                </a:effectLst>
+                <a:latin typeface="AngsanaUPC" panose="02020603050405020304" pitchFamily="18" charset="-34"/>
+                <a:cs typeface="AngsanaUPC" panose="02020603050405020304" pitchFamily="18" charset="-34"/>
+              </a:defRPr>
+            </a:lvl1pPr>
+          </a:lstStyle>
           <a:p>
             <a:r>
-              <a:rPr lang="en-US" sz="3200" i="1" dirty="0">
-                <a:solidFill>
-                  <a:srgbClr val="511290"/>
-                </a:solidFill>
-                <a:latin typeface="AngsanaUPC" panose="02020603050405020304" pitchFamily="18" charset="-34"/>
-                <a:cs typeface="AngsanaUPC" panose="02020603050405020304" pitchFamily="18" charset="-34"/>
-              </a:rPr>
+              <a:rPr lang="en-US" sz="2800" dirty="0"/>
               <a:t>Link</a:t>
             </a:r>
+            <a:endParaRPr lang="en-US" dirty="0"/>
           </a:p>
           <a:p>
-            <a:endParaRPr lang="en-US" sz="3200" i="1" dirty="0">
-              <a:solidFill>
-                <a:srgbClr val="511290"/>
-              </a:solidFill>
-              <a:latin typeface="AngsanaUPC" panose="02020603050405020304" pitchFamily="18" charset="-34"/>
-              <a:cs typeface="AngsanaUPC" panose="02020603050405020304" pitchFamily="18" charset="-34"/>
-            </a:endParaRPr>
+            <a:endParaRPr lang="en-US" dirty="0"/>
           </a:p>
           <a:p>
-            <a:endParaRPr lang="en-US" sz="3200" i="1" dirty="0">
-              <a:solidFill>
-                <a:srgbClr val="511290"/>
-              </a:solidFill>
-              <a:latin typeface="AngsanaUPC" panose="02020603050405020304" pitchFamily="18" charset="-34"/>
-              <a:cs typeface="AngsanaUPC" panose="02020603050405020304" pitchFamily="18" charset="-34"/>
-            </a:endParaRPr>
+            <a:endParaRPr lang="en-US" dirty="0"/>
           </a:p>
           <a:p>
-            <a:endParaRPr lang="en-US" sz="3200" i="1" dirty="0">
-              <a:solidFill>
-                <a:srgbClr val="511290"/>
-              </a:solidFill>
-              <a:latin typeface="AngsanaUPC" panose="02020603050405020304" pitchFamily="18" charset="-34"/>
-              <a:cs typeface="AngsanaUPC" panose="02020603050405020304" pitchFamily="18" charset="-34"/>
-            </a:endParaRPr>
+            <a:endParaRPr lang="en-US" dirty="0"/>
           </a:p>
           <a:p>
-            <a:endParaRPr lang="en-US" sz="3200" i="1" dirty="0">
-              <a:solidFill>
-                <a:srgbClr val="511290"/>
-              </a:solidFill>
-              <a:latin typeface="AngsanaUPC" panose="02020603050405020304" pitchFamily="18" charset="-34"/>
-              <a:cs typeface="AngsanaUPC" panose="02020603050405020304" pitchFamily="18" charset="-34"/>
-            </a:endParaRPr>
+            <a:endParaRPr lang="en-US" dirty="0"/>
           </a:p>
         </p:txBody>
       </p:sp>
@@ -8083,20 +8097,20 @@
             <a:r>
               <a:rPr lang="en-US" sz="2800" i="1" dirty="0">
                 <a:solidFill>
-                  <a:srgbClr val="511290"/>
+                  <a:srgbClr val="F7E609"/>
                 </a:solidFill>
+                <a:effectLst>
+                  <a:outerShdw blurRad="25400" dist="38100" dir="8100000" algn="tr" rotWithShape="0">
+                    <a:prstClr val="black">
+                      <a:alpha val="70000"/>
+                    </a:prstClr>
+                  </a:outerShdw>
+                </a:effectLst>
                 <a:latin typeface="AngsanaUPC" panose="02020603050405020304" pitchFamily="18" charset="-34"/>
                 <a:cs typeface="AngsanaUPC" panose="02020603050405020304" pitchFamily="18" charset="-34"/>
               </a:rPr>
               <a:t>Icon</a:t>
             </a:r>
-            <a:endParaRPr lang="en-US" sz="3200" i="1" dirty="0">
-              <a:solidFill>
-                <a:srgbClr val="511290"/>
-              </a:solidFill>
-              <a:latin typeface="AngsanaUPC" panose="02020603050405020304" pitchFamily="18" charset="-34"/>
-              <a:cs typeface="AngsanaUPC" panose="02020603050405020304" pitchFamily="18" charset="-34"/>
-            </a:endParaRPr>
           </a:p>
         </p:txBody>
       </p:sp>
@@ -8123,10 +8137,16 @@
           <a:gradFill>
             <a:gsLst>
               <a:gs pos="0">
-                <a:srgbClr val="B8A7FF"/>
+                <a:schemeClr val="accent1">
+                  <a:lumMod val="20000"/>
+                  <a:lumOff val="80000"/>
+                </a:schemeClr>
               </a:gs>
               <a:gs pos="100000">
-                <a:srgbClr val="B8B8E6"/>
+                <a:srgbClr val="93BCE9"/>
+              </a:gs>
+              <a:gs pos="4000">
+                <a:srgbClr val="93BCE9"/>
               </a:gs>
             </a:gsLst>
             <a:lin ang="5400000" scaled="1"/>
@@ -8236,13 +8256,34 @@
             <a:r>
               <a:rPr lang="en-US" sz="3200" i="1" dirty="0">
                 <a:solidFill>
-                  <a:srgbClr val="511290"/>
+                  <a:srgbClr val="F7E609"/>
                 </a:solidFill>
+                <a:effectLst>
+                  <a:outerShdw blurRad="25400" dist="38100" dir="8100000" algn="tr" rotWithShape="0">
+                    <a:prstClr val="black">
+                      <a:alpha val="70000"/>
+                    </a:prstClr>
+                  </a:outerShdw>
+                </a:effectLst>
                 <a:latin typeface="AngsanaUPC" panose="02020603050405020304" pitchFamily="18" charset="-34"/>
                 <a:cs typeface="AngsanaUPC" panose="02020603050405020304" pitchFamily="18" charset="-34"/>
               </a:rPr>
               <a:t>Expand-Box</a:t>
             </a:r>
+            <a:endParaRPr lang="en-US" sz="2800" i="1" dirty="0">
+              <a:solidFill>
+                <a:srgbClr val="F7E609"/>
+              </a:solidFill>
+              <a:effectLst>
+                <a:outerShdw blurRad="25400" dist="38100" dir="8100000" algn="tr" rotWithShape="0">
+                  <a:prstClr val="black">
+                    <a:alpha val="70000"/>
+                  </a:prstClr>
+                </a:outerShdw>
+              </a:effectLst>
+              <a:latin typeface="AngsanaUPC" panose="02020603050405020304" pitchFamily="18" charset="-34"/>
+              <a:cs typeface="AngsanaUPC" panose="02020603050405020304" pitchFamily="18" charset="-34"/>
+            </a:endParaRPr>
           </a:p>
         </p:txBody>
       </p:sp>
@@ -8342,14 +8383,14 @@
         </p:nvSpPr>
         <p:spPr>
           <a:xfrm rot="5400000">
-            <a:off x="5411194" y="-4545120"/>
-            <a:ext cx="291790" cy="10420876"/>
+            <a:off x="5364145" y="-4554299"/>
+            <a:ext cx="385887" cy="10420876"/>
           </a:xfrm>
           <a:prstGeom prst="rect">
             <a:avLst/>
           </a:prstGeom>
           <a:solidFill>
-            <a:srgbClr val="BDBEE1"/>
+            <a:srgbClr val="143860"/>
           </a:solidFill>
           <a:ln>
             <a:noFill/>
@@ -8411,7 +8452,7 @@
         </p:blipFill>
         <p:spPr>
           <a:xfrm rot="2700000">
-            <a:off x="10450944" y="542241"/>
+            <a:off x="10458978" y="541205"/>
             <a:ext cx="248409" cy="248409"/>
           </a:xfrm>
           <a:prstGeom prst="rect">
@@ -8433,8 +8474,8 @@
         </p:nvSpPr>
         <p:spPr>
           <a:xfrm>
-            <a:off x="4103689" y="584569"/>
-            <a:ext cx="2747110" cy="184666"/>
+            <a:off x="4145822" y="564084"/>
+            <a:ext cx="2715675" cy="184666"/>
           </a:xfrm>
           <a:prstGeom prst="rect">
             <a:avLst/>
@@ -8506,8 +8547,8 @@
         </p:nvSpPr>
         <p:spPr>
           <a:xfrm>
-            <a:off x="531536" y="620923"/>
-            <a:ext cx="88789" cy="88789"/>
+            <a:off x="430076" y="518435"/>
+            <a:ext cx="245410" cy="245410"/>
           </a:xfrm>
           <a:prstGeom prst="ellipse">
             <a:avLst/>
@@ -8553,7 +8594,7 @@
         </p:nvSpPr>
         <p:spPr>
           <a:xfrm>
-            <a:off x="776946" y="620923"/>
+            <a:off x="809907" y="675056"/>
             <a:ext cx="88789" cy="88789"/>
           </a:xfrm>
           <a:prstGeom prst="ellipse">
@@ -8607,7 +8648,7 @@
         </p:nvSpPr>
         <p:spPr>
           <a:xfrm>
-            <a:off x="1023158" y="620923"/>
+            <a:off x="1056119" y="675056"/>
             <a:ext cx="88789" cy="88789"/>
           </a:xfrm>
           <a:prstGeom prst="ellipse">
@@ -8661,7 +8702,7 @@
         </p:nvSpPr>
         <p:spPr>
           <a:xfrm>
-            <a:off x="1316845" y="624825"/>
+            <a:off x="1349806" y="678958"/>
             <a:ext cx="88789" cy="88789"/>
           </a:xfrm>
           <a:prstGeom prst="ellipse">
@@ -8717,8 +8758,8 @@
         </p:nvSpPr>
         <p:spPr>
           <a:xfrm>
-            <a:off x="-218229" y="3501840"/>
-            <a:ext cx="1795787" cy="461665"/>
+            <a:off x="-172360" y="3520246"/>
+            <a:ext cx="1795787" cy="523220"/>
           </a:xfrm>
           <a:prstGeom prst="rect">
             <a:avLst/>
@@ -8732,10 +8773,17 @@
           <a:lstStyle/>
           <a:p>
             <a:r>
-              <a:rPr lang="en-US" sz="2400" i="1" dirty="0">
+              <a:rPr lang="en-US" sz="2800" i="1" dirty="0">
                 <a:solidFill>
-                  <a:srgbClr val="511290"/>
+                  <a:srgbClr val="F7E609"/>
                 </a:solidFill>
+                <a:effectLst>
+                  <a:outerShdw blurRad="25400" dist="38100" dir="8100000" algn="tr" rotWithShape="0">
+                    <a:prstClr val="black">
+                      <a:alpha val="70000"/>
+                    </a:prstClr>
+                  </a:outerShdw>
+                </a:effectLst>
                 <a:latin typeface="AngsanaUPC" panose="02020603050405020304" pitchFamily="18" charset="-34"/>
                 <a:cs typeface="AngsanaUPC" panose="02020603050405020304" pitchFamily="18" charset="-34"/>
               </a:rPr>
@@ -8758,8 +8806,8 @@
         </p:nvSpPr>
         <p:spPr>
           <a:xfrm>
-            <a:off x="7270536" y="189822"/>
-            <a:ext cx="1795787" cy="584775"/>
+            <a:off x="7466025" y="142552"/>
+            <a:ext cx="1795787" cy="646331"/>
           </a:xfrm>
           <a:prstGeom prst="rect">
             <a:avLst/>
@@ -8770,16 +8818,30 @@
           <a:bodyPr wrap="square" rtlCol="0">
             <a:spAutoFit/>
           </a:bodyPr>
-          <a:lstStyle/>
+          <a:lstStyle>
+            <a:defPPr>
+              <a:defRPr lang="en-US"/>
+            </a:defPPr>
+            <a:lvl1pPr>
+              <a:defRPr sz="2400" i="1">
+                <a:solidFill>
+                  <a:srgbClr val="F7E609"/>
+                </a:solidFill>
+                <a:effectLst>
+                  <a:outerShdw blurRad="25400" dist="38100" dir="8100000" algn="tr" rotWithShape="0">
+                    <a:prstClr val="black">
+                      <a:alpha val="70000"/>
+                    </a:prstClr>
+                  </a:outerShdw>
+                </a:effectLst>
+                <a:latin typeface="AngsanaUPC" panose="02020603050405020304" pitchFamily="18" charset="-34"/>
+                <a:cs typeface="AngsanaUPC" panose="02020603050405020304" pitchFamily="18" charset="-34"/>
+              </a:defRPr>
+            </a:lvl1pPr>
+          </a:lstStyle>
           <a:p>
             <a:r>
-              <a:rPr lang="en-US" sz="3200" i="1" dirty="0">
-                <a:solidFill>
-                  <a:srgbClr val="511290"/>
-                </a:solidFill>
-                <a:latin typeface="AngsanaUPC" panose="02020603050405020304" pitchFamily="18" charset="-34"/>
-                <a:cs typeface="AngsanaUPC" panose="02020603050405020304" pitchFamily="18" charset="-34"/>
-              </a:rPr>
+              <a:rPr lang="en-US" sz="3600" dirty="0"/>
               <a:t>Title Bar</a:t>
             </a:r>
           </a:p>
@@ -8838,7 +8900,7 @@
         </p:nvSpPr>
         <p:spPr>
           <a:xfrm>
-            <a:off x="531536" y="17684"/>
+            <a:off x="543305" y="55454"/>
             <a:ext cx="1795787" cy="461665"/>
           </a:xfrm>
           <a:prstGeom prst="rect">
@@ -8855,8 +8917,15 @@
             <a:r>
               <a:rPr lang="en-US" sz="2400" i="1" dirty="0">
                 <a:solidFill>
-                  <a:srgbClr val="511290"/>
+                  <a:srgbClr val="F7E609"/>
                 </a:solidFill>
+                <a:effectLst>
+                  <a:outerShdw blurRad="25400" dist="38100" dir="8100000" algn="tr" rotWithShape="0">
+                    <a:prstClr val="black">
+                      <a:alpha val="70000"/>
+                    </a:prstClr>
+                  </a:outerShdw>
+                </a:effectLst>
                 <a:latin typeface="AngsanaUPC" panose="02020603050405020304" pitchFamily="18" charset="-34"/>
                 <a:cs typeface="AngsanaUPC" panose="02020603050405020304" pitchFamily="18" charset="-34"/>
               </a:rPr>
@@ -8879,7 +8948,7 @@
         </p:nvSpPr>
         <p:spPr>
           <a:xfrm>
-            <a:off x="-289154" y="4356657"/>
+            <a:off x="-229103" y="4375721"/>
             <a:ext cx="1795787" cy="461665"/>
           </a:xfrm>
           <a:prstGeom prst="rect">
@@ -8891,16 +8960,30 @@
           <a:bodyPr wrap="square" rtlCol="0">
             <a:spAutoFit/>
           </a:bodyPr>
-          <a:lstStyle/>
+          <a:lstStyle>
+            <a:defPPr>
+              <a:defRPr lang="en-US"/>
+            </a:defPPr>
+            <a:lvl1pPr>
+              <a:defRPr sz="2800" i="1">
+                <a:solidFill>
+                  <a:srgbClr val="F7E609"/>
+                </a:solidFill>
+                <a:effectLst>
+                  <a:outerShdw blurRad="25400" dist="38100" dir="8100000" algn="tr" rotWithShape="0">
+                    <a:prstClr val="black">
+                      <a:alpha val="70000"/>
+                    </a:prstClr>
+                  </a:outerShdw>
+                </a:effectLst>
+                <a:latin typeface="AngsanaUPC" panose="02020603050405020304" pitchFamily="18" charset="-34"/>
+                <a:cs typeface="AngsanaUPC" panose="02020603050405020304" pitchFamily="18" charset="-34"/>
+              </a:defRPr>
+            </a:lvl1pPr>
+          </a:lstStyle>
           <a:p>
             <a:r>
-              <a:rPr lang="en-US" sz="2400" i="1" dirty="0">
-                <a:solidFill>
-                  <a:srgbClr val="511290"/>
-                </a:solidFill>
-                <a:latin typeface="AngsanaUPC" panose="02020603050405020304" pitchFamily="18" charset="-34"/>
-                <a:cs typeface="AngsanaUPC" panose="02020603050405020304" pitchFamily="18" charset="-34"/>
-              </a:rPr>
+              <a:rPr lang="en-US" dirty="0"/>
               <a:t>Edit Preferences</a:t>
             </a:r>
           </a:p>
@@ -8932,16 +9015,30 @@
           <a:bodyPr wrap="square" rtlCol="0">
             <a:spAutoFit/>
           </a:bodyPr>
-          <a:lstStyle/>
+          <a:lstStyle>
+            <a:defPPr>
+              <a:defRPr lang="en-US"/>
+            </a:defPPr>
+            <a:lvl1pPr>
+              <a:defRPr sz="2800" i="1">
+                <a:solidFill>
+                  <a:srgbClr val="F7E609"/>
+                </a:solidFill>
+                <a:effectLst>
+                  <a:outerShdw blurRad="25400" dist="38100" dir="8100000" algn="tr" rotWithShape="0">
+                    <a:prstClr val="black">
+                      <a:alpha val="70000"/>
+                    </a:prstClr>
+                  </a:outerShdw>
+                </a:effectLst>
+                <a:latin typeface="AngsanaUPC" panose="02020603050405020304" pitchFamily="18" charset="-34"/>
+                <a:cs typeface="AngsanaUPC" panose="02020603050405020304" pitchFamily="18" charset="-34"/>
+              </a:defRPr>
+            </a:lvl1pPr>
+          </a:lstStyle>
           <a:p>
             <a:r>
-              <a:rPr lang="en-US" sz="2400" i="1" dirty="0">
-                <a:solidFill>
-                  <a:srgbClr val="511290"/>
-                </a:solidFill>
-                <a:latin typeface="AngsanaUPC" panose="02020603050405020304" pitchFamily="18" charset="-34"/>
-                <a:cs typeface="AngsanaUPC" panose="02020603050405020304" pitchFamily="18" charset="-34"/>
-              </a:rPr>
+              <a:rPr lang="en-US" dirty="0"/>
               <a:t>Menu/Account</a:t>
             </a:r>
           </a:p>
@@ -9473,8 +9570,8 @@
         </p:nvSpPr>
         <p:spPr>
           <a:xfrm>
-            <a:off x="9395992" y="885002"/>
-            <a:ext cx="1609316" cy="276999"/>
+            <a:off x="649719" y="436727"/>
+            <a:ext cx="1609316" cy="261610"/>
           </a:xfrm>
           <a:prstGeom prst="rect">
             <a:avLst/>
@@ -9488,63 +9585,22 @@
           <a:lstStyle/>
           <a:p>
             <a:r>
-              <a:rPr lang="en-US" sz="1200" i="1" dirty="0">
+              <a:rPr lang="en-US" sz="1100" i="1" dirty="0">
+                <a:solidFill>
+                  <a:schemeClr val="bg1"/>
+                </a:solidFill>
                 <a:latin typeface="Aharoni" panose="02010803020104030203" pitchFamily="2" charset="-79"/>
                 <a:cs typeface="Aharoni" panose="02010803020104030203" pitchFamily="2" charset="-79"/>
               </a:rPr>
               <a:t>General View</a:t>
             </a:r>
-            <a:endParaRPr lang="en-US" i="1" dirty="0">
+            <a:endParaRPr lang="en-US" sz="1600" i="1" dirty="0">
+              <a:solidFill>
+                <a:schemeClr val="bg1"/>
+              </a:solidFill>
               <a:latin typeface="Aharoni" panose="02010803020104030203" pitchFamily="2" charset="-79"/>
               <a:cs typeface="Aharoni" panose="02010803020104030203" pitchFamily="2" charset="-79"/>
             </a:endParaRPr>
-          </a:p>
-        </p:txBody>
-      </p:sp>
-      <p:sp>
-        <p:nvSpPr>
-          <p:cNvPr id="73" name="Oval 72">
-            <a:extLst>
-              <a:ext uri="{FF2B5EF4-FFF2-40B4-BE49-F238E27FC236}">
-                <a16:creationId xmlns:a16="http://schemas.microsoft.com/office/drawing/2014/main" id="{8CC279A3-866B-447F-9031-63233A655234}"/>
-              </a:ext>
-            </a:extLst>
-          </p:cNvPr>
-          <p:cNvSpPr/>
-          <p:nvPr/>
-        </p:nvSpPr>
-        <p:spPr>
-          <a:xfrm>
-            <a:off x="10583183" y="990707"/>
-            <a:ext cx="88789" cy="88789"/>
-          </a:xfrm>
-          <a:prstGeom prst="ellipse">
-            <a:avLst/>
-          </a:prstGeom>
-          <a:ln w="15875"/>
-        </p:spPr>
-        <p:style>
-          <a:lnRef idx="2">
-            <a:schemeClr val="accent1">
-              <a:shade val="50000"/>
-            </a:schemeClr>
-          </a:lnRef>
-          <a:fillRef idx="1">
-            <a:schemeClr val="accent1"/>
-          </a:fillRef>
-          <a:effectRef idx="0">
-            <a:schemeClr val="accent1"/>
-          </a:effectRef>
-          <a:fontRef idx="minor">
-            <a:schemeClr val="lt1"/>
-          </a:fontRef>
-        </p:style>
-        <p:txBody>
-          <a:bodyPr rtlCol="0" anchor="ctr"/>
-          <a:lstStyle/>
-          <a:p>
-            <a:pPr algn="ctr"/>
-            <a:endParaRPr lang="en-US"/>
           </a:p>
         </p:txBody>
       </p:sp>

</xml_diff>